<commit_message>
added sample of expression tree
</commit_message>
<xml_diff>
--- a/8 - Binary Search Tree and Heap/Binary Expression Tree.pptx
+++ b/8 - Binary Search Tree and Heap/Binary Expression Tree.pptx
@@ -222,7 +222,7 @@
           <a:p>
             <a:fld id="{F666E1FD-E7A0-497B-BBC0-740BAAC97C64}" type="datetimeFigureOut">
               <a:rPr lang="en-PH" smtClean="0"/>
-              <a:t>10/2/23</a:t>
+              <a:t>10/9/23</a:t>
             </a:fld>
             <a:endParaRPr lang="en-PH"/>
           </a:p>
@@ -3035,7 +3035,7 @@
           <a:p>
             <a:fld id="{0CCF0B81-6BD8-4C65-9459-815598C5F1F4}" type="datetimeFigureOut">
               <a:rPr lang="en-PH" smtClean="0"/>
-              <a:t>10/2/23</a:t>
+              <a:t>10/9/23</a:t>
             </a:fld>
             <a:endParaRPr lang="en-PH"/>
           </a:p>
@@ -3235,7 +3235,7 @@
           <a:p>
             <a:fld id="{0CCF0B81-6BD8-4C65-9459-815598C5F1F4}" type="datetimeFigureOut">
               <a:rPr lang="en-PH" smtClean="0"/>
-              <a:t>10/2/23</a:t>
+              <a:t>10/9/23</a:t>
             </a:fld>
             <a:endParaRPr lang="en-PH"/>
           </a:p>
@@ -3445,7 +3445,7 @@
           <a:p>
             <a:fld id="{0CCF0B81-6BD8-4C65-9459-815598C5F1F4}" type="datetimeFigureOut">
               <a:rPr lang="en-PH" smtClean="0"/>
-              <a:t>10/2/23</a:t>
+              <a:t>10/9/23</a:t>
             </a:fld>
             <a:endParaRPr lang="en-PH"/>
           </a:p>
@@ -3645,7 +3645,7 @@
           <a:p>
             <a:fld id="{0CCF0B81-6BD8-4C65-9459-815598C5F1F4}" type="datetimeFigureOut">
               <a:rPr lang="en-PH" smtClean="0"/>
-              <a:t>10/2/23</a:t>
+              <a:t>10/9/23</a:t>
             </a:fld>
             <a:endParaRPr lang="en-PH"/>
           </a:p>
@@ -3921,7 +3921,7 @@
           <a:p>
             <a:fld id="{0CCF0B81-6BD8-4C65-9459-815598C5F1F4}" type="datetimeFigureOut">
               <a:rPr lang="en-PH" smtClean="0"/>
-              <a:t>10/2/23</a:t>
+              <a:t>10/9/23</a:t>
             </a:fld>
             <a:endParaRPr lang="en-PH"/>
           </a:p>
@@ -4189,7 +4189,7 @@
           <a:p>
             <a:fld id="{0CCF0B81-6BD8-4C65-9459-815598C5F1F4}" type="datetimeFigureOut">
               <a:rPr lang="en-PH" smtClean="0"/>
-              <a:t>10/2/23</a:t>
+              <a:t>10/9/23</a:t>
             </a:fld>
             <a:endParaRPr lang="en-PH"/>
           </a:p>
@@ -4604,7 +4604,7 @@
           <a:p>
             <a:fld id="{0CCF0B81-6BD8-4C65-9459-815598C5F1F4}" type="datetimeFigureOut">
               <a:rPr lang="en-PH" smtClean="0"/>
-              <a:t>10/2/23</a:t>
+              <a:t>10/9/23</a:t>
             </a:fld>
             <a:endParaRPr lang="en-PH"/>
           </a:p>
@@ -4746,7 +4746,7 @@
           <a:p>
             <a:fld id="{0CCF0B81-6BD8-4C65-9459-815598C5F1F4}" type="datetimeFigureOut">
               <a:rPr lang="en-PH" smtClean="0"/>
-              <a:t>10/2/23</a:t>
+              <a:t>10/9/23</a:t>
             </a:fld>
             <a:endParaRPr lang="en-PH"/>
           </a:p>
@@ -4859,7 +4859,7 @@
           <a:p>
             <a:fld id="{0CCF0B81-6BD8-4C65-9459-815598C5F1F4}" type="datetimeFigureOut">
               <a:rPr lang="en-PH" smtClean="0"/>
-              <a:t>10/2/23</a:t>
+              <a:t>10/9/23</a:t>
             </a:fld>
             <a:endParaRPr lang="en-PH"/>
           </a:p>
@@ -5172,7 +5172,7 @@
           <a:p>
             <a:fld id="{0CCF0B81-6BD8-4C65-9459-815598C5F1F4}" type="datetimeFigureOut">
               <a:rPr lang="en-PH" smtClean="0"/>
-              <a:t>10/2/23</a:t>
+              <a:t>10/9/23</a:t>
             </a:fld>
             <a:endParaRPr lang="en-PH"/>
           </a:p>
@@ -5461,7 +5461,7 @@
           <a:p>
             <a:fld id="{0CCF0B81-6BD8-4C65-9459-815598C5F1F4}" type="datetimeFigureOut">
               <a:rPr lang="en-PH" smtClean="0"/>
-              <a:t>10/2/23</a:t>
+              <a:t>10/9/23</a:t>
             </a:fld>
             <a:endParaRPr lang="en-PH"/>
           </a:p>
@@ -5704,7 +5704,7 @@
           <a:p>
             <a:fld id="{0CCF0B81-6BD8-4C65-9459-815598C5F1F4}" type="datetimeFigureOut">
               <a:rPr lang="en-PH" smtClean="0"/>
-              <a:t>10/2/23</a:t>
+              <a:t>10/9/23</a:t>
             </a:fld>
             <a:endParaRPr lang="en-PH"/>
           </a:p>
@@ -9556,51 +9556,6 @@
               <a:rPr lang="en-PH" dirty="0"/>
               <a:t>operand</a:t>
             </a:r>
-          </a:p>
-        </p:txBody>
-      </p:sp>
-      <p:sp>
-        <p:nvSpPr>
-          <p:cNvPr id="10" name="TextBox 9">
-            <a:extLst>
-              <a:ext uri="{FF2B5EF4-FFF2-40B4-BE49-F238E27FC236}">
-                <a16:creationId xmlns:a16="http://schemas.microsoft.com/office/drawing/2014/main" id="{46C2DD3C-43AB-CDB0-880A-E7ACF85D7CFF}"/>
-              </a:ext>
-            </a:extLst>
-          </p:cNvPr>
-          <p:cNvSpPr txBox="1"/>
-          <p:nvPr/>
-        </p:nvSpPr>
-        <p:spPr>
-          <a:xfrm>
-            <a:off x="233646" y="1507087"/>
-            <a:ext cx="3130704" cy="923330"/>
-          </a:xfrm>
-          <a:prstGeom prst="rect">
-            <a:avLst/>
-          </a:prstGeom>
-          <a:noFill/>
-        </p:spPr>
-        <p:txBody>
-          <a:bodyPr wrap="square" rtlCol="0">
-            <a:spAutoFit/>
-          </a:bodyPr>
-          <a:lstStyle/>
-          <a:p>
-            <a:r>
-              <a:rPr lang="en-PH" b="1" dirty="0"/>
-              <a:t>Code Implementation:</a:t>
-            </a:r>
-            <a:br>
-              <a:rPr lang="en-PH" dirty="0"/>
-            </a:br>
-            <a:r>
-              <a:rPr lang="en-PH" sz="1200" dirty="0">
-                <a:hlinkClick r:id="rId5"/>
-              </a:rPr>
-              <a:t>https://github.com/robitussin/CCDATRCL/tree/main/week_7_to_8/binary_expression_tree/expression_3</a:t>
-            </a:r>
-            <a:endParaRPr lang="en-PH" sz="1200" dirty="0"/>
           </a:p>
         </p:txBody>
       </p:sp>
@@ -16929,53 +16884,6 @@
           </a:p>
         </p:txBody>
       </p:sp>
-      <p:sp>
-        <p:nvSpPr>
-          <p:cNvPr id="17" name="TextBox 16">
-            <a:extLst>
-              <a:ext uri="{FF2B5EF4-FFF2-40B4-BE49-F238E27FC236}">
-                <a16:creationId xmlns:a16="http://schemas.microsoft.com/office/drawing/2014/main" id="{E9B76668-7718-DCCE-3687-FD76990F6E0A}"/>
-              </a:ext>
-            </a:extLst>
-          </p:cNvPr>
-          <p:cNvSpPr txBox="1"/>
-          <p:nvPr/>
-        </p:nvSpPr>
-        <p:spPr>
-          <a:xfrm>
-            <a:off x="1252270" y="5442770"/>
-            <a:ext cx="9687460" cy="553998"/>
-          </a:xfrm>
-          <a:prstGeom prst="rect">
-            <a:avLst/>
-          </a:prstGeom>
-          <a:noFill/>
-        </p:spPr>
-        <p:txBody>
-          <a:bodyPr wrap="none" rtlCol="0">
-            <a:spAutoFit/>
-          </a:bodyPr>
-          <a:lstStyle/>
-          <a:p>
-            <a:r>
-              <a:rPr lang="en-PH" sz="1500" b="1" dirty="0"/>
-              <a:t>Code Implementation</a:t>
-            </a:r>
-            <a:br>
-              <a:rPr lang="en-PH" sz="1500" dirty="0">
-                <a:hlinkClick r:id="rId4"/>
-              </a:rPr>
-            </a:br>
-            <a:r>
-              <a:rPr lang="en-PH" sz="1500" dirty="0">
-                <a:hlinkClick r:id="rId4"/>
-              </a:rPr>
-              <a:t>https://github.com/robitussin/CCDATRCL/blob/main/week_7_to_8/binary_expression_tree/expression_1/BinaryTree.java</a:t>
-            </a:r>
-            <a:endParaRPr lang="en-PH" sz="1500" dirty="0"/>
-          </a:p>
-        </p:txBody>
-      </p:sp>
     </p:spTree>
     <p:extLst>
       <p:ext uri="{BB962C8B-B14F-4D97-AF65-F5344CB8AC3E}">
@@ -18279,53 +18187,6 @@
               <a:rPr lang="en-PH" dirty="0"/>
               <a:t>operator</a:t>
             </a:r>
-          </a:p>
-        </p:txBody>
-      </p:sp>
-      <p:sp>
-        <p:nvSpPr>
-          <p:cNvPr id="17" name="TextBox 16">
-            <a:extLst>
-              <a:ext uri="{FF2B5EF4-FFF2-40B4-BE49-F238E27FC236}">
-                <a16:creationId xmlns:a16="http://schemas.microsoft.com/office/drawing/2014/main" id="{73F4BA9B-8121-5F4F-6819-90FAA1F41EC8}"/>
-              </a:ext>
-            </a:extLst>
-          </p:cNvPr>
-          <p:cNvSpPr txBox="1"/>
-          <p:nvPr/>
-        </p:nvSpPr>
-        <p:spPr>
-          <a:xfrm>
-            <a:off x="1252270" y="5442770"/>
-            <a:ext cx="9687460" cy="553998"/>
-          </a:xfrm>
-          <a:prstGeom prst="rect">
-            <a:avLst/>
-          </a:prstGeom>
-          <a:noFill/>
-        </p:spPr>
-        <p:txBody>
-          <a:bodyPr wrap="none" rtlCol="0">
-            <a:spAutoFit/>
-          </a:bodyPr>
-          <a:lstStyle/>
-          <a:p>
-            <a:r>
-              <a:rPr lang="en-PH" sz="1500" b="1" dirty="0"/>
-              <a:t>Code Implementation</a:t>
-            </a:r>
-            <a:br>
-              <a:rPr lang="en-PH" sz="1500" dirty="0">
-                <a:hlinkClick r:id="rId4"/>
-              </a:rPr>
-            </a:br>
-            <a:r>
-              <a:rPr lang="en-PH" sz="1500" dirty="0">
-                <a:hlinkClick r:id="rId4"/>
-              </a:rPr>
-              <a:t>https://github.com/robitussin/CCDATRCL/blob/main/week_7_to_8/binary_expression_tree/expression_2/BinaryTree.java</a:t>
-            </a:r>
-            <a:endParaRPr lang="en-PH" sz="1500" dirty="0"/>
           </a:p>
         </p:txBody>
       </p:sp>
@@ -21022,15 +20883,6 @@
 </file>
 
 <file path=customXml/item2.xml><?xml version="1.0" encoding="utf-8"?>
-<?mso-contentType ?>
-<FormTemplates xmlns="http://schemas.microsoft.com/sharepoint/v3/contenttype/forms">
-  <Display>DocumentLibraryForm</Display>
-  <Edit>DocumentLibraryForm</Edit>
-  <New>DocumentLibraryForm</New>
-</FormTemplates>
-</file>
-
-<file path=customXml/item3.xml><?xml version="1.0" encoding="utf-8"?>
 <ct:contentTypeSchema xmlns:ct="http://schemas.microsoft.com/office/2006/metadata/contentType" xmlns:ma="http://schemas.microsoft.com/office/2006/metadata/properties/metaAttributes" ct:_="" ma:_="" ma:contentTypeName="Document" ma:contentTypeID="0x0101007188BDCA587B344BBA6CB1A93FAE6998" ma:contentTypeVersion="2" ma:contentTypeDescription="Create a new document." ma:contentTypeScope="" ma:versionID="7a8e4b6720badb2566a0cfeddfaf2856">
   <xsd:schema xmlns:xsd="http://www.w3.org/2001/XMLSchema" xmlns:xs="http://www.w3.org/2001/XMLSchema" xmlns:p="http://schemas.microsoft.com/office/2006/metadata/properties" xmlns:ns2="ba111d12-426d-4af0-bcb6-460e36974645" targetNamespace="http://schemas.microsoft.com/office/2006/metadata/properties" ma:root="true" ma:fieldsID="989b05398519136c88ba0a8d54e3c3da" ns2:_="">
     <xsd:import namespace="ba111d12-426d-4af0-bcb6-460e36974645"/>
@@ -21162,6 +21014,15 @@
 </ct:contentTypeSchema>
 </file>
 
+<file path=customXml/item3.xml><?xml version="1.0" encoding="utf-8"?>
+<?mso-contentType ?>
+<FormTemplates xmlns="http://schemas.microsoft.com/sharepoint/v3/contenttype/forms">
+  <Display>DocumentLibraryForm</Display>
+  <Edit>DocumentLibraryForm</Edit>
+  <New>DocumentLibraryForm</New>
+</FormTemplates>
+</file>
+
 <file path=customXml/itemProps1.xml><?xml version="1.0" encoding="utf-8"?>
 <ds:datastoreItem xmlns:ds="http://schemas.openxmlformats.org/officeDocument/2006/customXml" ds:itemID="{43CE9053-4ED0-4362-8F2D-90ACA45AEF84}">
   <ds:schemaRefs>
@@ -21172,14 +21033,6 @@
 </file>
 
 <file path=customXml/itemProps2.xml><?xml version="1.0" encoding="utf-8"?>
-<ds:datastoreItem xmlns:ds="http://schemas.openxmlformats.org/officeDocument/2006/customXml" ds:itemID="{E5586E43-7D2A-4643-9943-57501C9B09E9}">
-  <ds:schemaRefs>
-    <ds:schemaRef ds:uri="http://schemas.microsoft.com/sharepoint/v3/contenttype/forms"/>
-  </ds:schemaRefs>
-</ds:datastoreItem>
-</file>
-
-<file path=customXml/itemProps3.xml><?xml version="1.0" encoding="utf-8"?>
 <ds:datastoreItem xmlns:ds="http://schemas.openxmlformats.org/officeDocument/2006/customXml" ds:itemID="{8DA62525-F082-4800-9957-B8546404E0EF}">
   <ds:schemaRefs>
     <ds:schemaRef ds:uri="http://schemas.microsoft.com/office/2006/metadata/contentType"/>
@@ -21195,4 +21048,12 @@
     <ds:schemaRef ds:uri="http://schemas.microsoft.com/internal/obd"/>
   </ds:schemaRefs>
 </ds:datastoreItem>
+</file>
+
+<file path=customXml/itemProps3.xml><?xml version="1.0" encoding="utf-8"?>
+<ds:datastoreItem xmlns:ds="http://schemas.openxmlformats.org/officeDocument/2006/customXml" ds:itemID="{E5586E43-7D2A-4643-9943-57501C9B09E9}">
+  <ds:schemaRefs>
+    <ds:schemaRef ds:uri="http://schemas.microsoft.com/sharepoint/v3/contenttype/forms"/>
+  </ds:schemaRefs>
+</ds:datastoreItem>
 </file>
</xml_diff>